<commit_message>
generate by ai feature
</commit_message>
<xml_diff>
--- a/output/topic_quantum_computing_.pptx
+++ b/output/topic_quantum_computing_.pptx
@@ -15,8 +15,6 @@
     <p:sldId id="263" r:id="rId13"/>
     <p:sldId id="264" r:id="rId14"/>
     <p:sldId id="265" r:id="rId15"/>
-    <p:sldId id="266" r:id="rId16"/>
-    <p:sldId id="267" r:id="rId17"/>
   </p:sldIdLst>
   <p:sldSz cx="12192000" cy="6858000"/>
   <p:notesSz cx="6858000" cy="9144000"/>
@@ -5607,7 +5605,7 @@
           <a:lstStyle/>
           <a:p>
             <a:r>
-              <a:t>Prominent Players in the Quantum Computing Field</a:t>
+              <a:t>The Future of Quantum Computing</a:t>
             </a:r>
           </a:p>
         </p:txBody>
@@ -5630,131 +5628,7 @@
           <a:p>
             <a:pPr/>
             <a:r>
-              <a:t>Major technology companies (IBM, Google, Microsoft, Amazon).Startups focused on specific quantum computing technologies.Government-funded research initiatives.Academic institutions contributing to the field.Key collaborations and partnerships driving innovation.</a:t>
-            </a:r>
-          </a:p>
-        </p:txBody>
-      </p:sp>
-    </p:spTree>
-  </p:cSld>
-  <p:clrMapOvr>
-    <a:masterClrMapping/>
-  </p:clrMapOvr>
-</p:sld>
-</file>
-
-<file path=ppt/slides/slide11.xml><?xml version="1.0" encoding="utf-8"?>
-<p:sld xmlns:a="http://schemas.openxmlformats.org/drawingml/2006/main" xmlns:p="http://schemas.openxmlformats.org/presentationml/2006/main" xmlns:r="http://schemas.openxmlformats.org/officeDocument/2006/relationships">
-  <p:cSld>
-    <p:spTree>
-      <p:nvGrpSpPr>
-        <p:cNvPr id="1" name=""/>
-        <p:cNvGrpSpPr/>
-        <p:nvPr/>
-      </p:nvGrpSpPr>
-      <p:grpSpPr/>
-      <p:sp>
-        <p:nvSpPr>
-          <p:cNvPr id="2" name="Title 1"/>
-          <p:cNvSpPr>
-            <a:spLocks noGrp="1"/>
-          </p:cNvSpPr>
-          <p:nvPr>
-            <p:ph type="title"/>
-          </p:nvPr>
-        </p:nvSpPr>
-        <p:spPr/>
-        <p:txBody>
-          <a:bodyPr/>
-          <a:lstStyle/>
-          <a:p>
-            <a:r>
-              <a:t>The Future of Quantum Computing</a:t>
-            </a:r>
-          </a:p>
-        </p:txBody>
-      </p:sp>
-      <p:sp>
-        <p:nvSpPr>
-          <p:cNvPr id="3" name="Content Placeholder 2"/>
-          <p:cNvSpPr>
-            <a:spLocks noGrp="1"/>
-          </p:cNvSpPr>
-          <p:nvPr>
-            <p:ph idx="1"/>
-          </p:nvPr>
-        </p:nvSpPr>
-        <p:spPr/>
-        <p:txBody>
-          <a:bodyPr/>
-          <a:lstStyle/>
-          <a:p/>
-          <a:p>
-            <a:pPr/>
-            <a:r>
-              <a:t>Predictions for the timeline of quantum computing advancements.Potential breakthroughs and their impact on various sectors.Addressing ethical considerations and societal implications.The need for continued research and development.The potential for quantum computing to revolutionize technology.</a:t>
-            </a:r>
-          </a:p>
-        </p:txBody>
-      </p:sp>
-    </p:spTree>
-  </p:cSld>
-  <p:clrMapOvr>
-    <a:masterClrMapping/>
-  </p:clrMapOvr>
-</p:sld>
-</file>
-
-<file path=ppt/slides/slide12.xml><?xml version="1.0" encoding="utf-8"?>
-<p:sld xmlns:a="http://schemas.openxmlformats.org/drawingml/2006/main" xmlns:p="http://schemas.openxmlformats.org/presentationml/2006/main" xmlns:r="http://schemas.openxmlformats.org/officeDocument/2006/relationships">
-  <p:cSld>
-    <p:spTree>
-      <p:nvGrpSpPr>
-        <p:cNvPr id="1" name=""/>
-        <p:cNvGrpSpPr/>
-        <p:nvPr/>
-      </p:nvGrpSpPr>
-      <p:grpSpPr/>
-      <p:sp>
-        <p:nvSpPr>
-          <p:cNvPr id="2" name="Title 1"/>
-          <p:cNvSpPr>
-            <a:spLocks noGrp="1"/>
-          </p:cNvSpPr>
-          <p:nvPr>
-            <p:ph type="title"/>
-          </p:nvPr>
-        </p:nvSpPr>
-        <p:spPr/>
-        <p:txBody>
-          <a:bodyPr/>
-          <a:lstStyle/>
-          <a:p>
-            <a:r>
-              <a:t>Conclusion: Quantum Computing's Potential and Path Forward</a:t>
-            </a:r>
-          </a:p>
-        </p:txBody>
-      </p:sp>
-      <p:sp>
-        <p:nvSpPr>
-          <p:cNvPr id="3" name="Content Placeholder 2"/>
-          <p:cNvSpPr>
-            <a:spLocks noGrp="1"/>
-          </p:cNvSpPr>
-          <p:nvPr>
-            <p:ph idx="1"/>
-          </p:nvPr>
-        </p:nvSpPr>
-        <p:spPr/>
-        <p:txBody>
-          <a:bodyPr/>
-          <a:lstStyle/>
-          <a:p/>
-          <a:p>
-            <a:pPr/>
-            <a:r>
-              <a:t>Summary of key takeaways regarding quantum computing's capabilities.Recap of current challenges and future prospects.Emphasis on the transformative potential of quantum computing.Call to action:  Further exploration and engagement with the field.Q&amp;A session.</a:t>
+              <a:t>Continued advancements in hardware and software are expected.Increased accessibility and affordability of quantum computing resources.Collaboration between academia, industry, and government is essential.Potential for disruptive innovations across various sectors.Ethical considerations and societal impacts need careful consideration.Quantum computing will likely coexist with classical computing, complementing its strengths.A new era of scientific discovery and technological advancement is on the horizon.</a:t>
             </a:r>
           </a:p>
         </p:txBody>
@@ -5793,7 +5667,7 @@
           <a:lstStyle/>
           <a:p>
             <a:r>
-              <a:t>Quantum Computing: A Leap into the Future of Computation</a:t>
+              <a:t>Quantum Computing: A New Era of Computation</a:t>
             </a:r>
           </a:p>
         </p:txBody>
@@ -5816,7 +5690,7 @@
           <a:p>
             <a:pPr/>
             <a:r>
-              <a:t>Created by: Aditya Bhogil</a:t>
+              <a:t>Created by: guppi</a:t>
             </a:r>
           </a:p>
         </p:txBody>
@@ -5878,7 +5752,7 @@
           <a:p>
             <a:pPr/>
             <a:r>
-              <a:t>1.Introduction to Quantum Computing2.Quantum Bits (Qubits): The Building Blocks3.Quantum Superposition and Entanglement4.Quantum Algorithms and Their Power5.Quantum Computing Applications6.Current Challenges and Limitations7.Prominent Players in the Quantum Computing Field8.The Future of Quantum Computing9.Conclusion: Quantum Computing's Potential and Path ForwardConclusion</a:t>
+              <a:t>1.Introduction to Quantum Computing2.Quantum Bits (Qubits) and Superposition3.Quantum Entanglement and its Implications4.Quantum Algorithms and their Advantages5.Current Applications and Future Potential6.Challenges and Limitations of Quantum Computing7.The Future of Quantum ComputingConclusion</a:t>
             </a:r>
           </a:p>
         </p:txBody>
@@ -5940,7 +5814,7 @@
           <a:p>
             <a:pPr/>
             <a:r>
-              <a:t>Classical vs. Quantum Computing: A fundamental comparison.The promise of exponentially faster computation.Key differences in computational approaches.Overview of the potential impact on various fields.Addressing common misconceptions about quantum computing.Setting the stage for understanding the core concepts.</a:t>
+              <a:t>Classical computers use bits representing 0 or 1.Quantum computers use qubits, leveraging superposition and entanglement.Quantum computing harnesses quantum mechanics to solve complex problems.Potential to revolutionize various fields like medicine, materials science, and finance.Significant advancements in hardware and software are ongoing.Explores computation beyond the limitations of classical computers.Focuses on solving problems intractable for classical systems.</a:t>
             </a:r>
           </a:p>
         </p:txBody>
@@ -5979,7 +5853,7 @@
           <a:lstStyle/>
           <a:p>
             <a:r>
-              <a:t>Quantum Bits (Qubits): The Building Blocks</a:t>
+              <a:t>Quantum Bits (Qubits) and Superposition</a:t>
             </a:r>
           </a:p>
         </p:txBody>
@@ -6002,7 +5876,7 @@
           <a:p>
             <a:pPr/>
             <a:r>
-              <a:t>Defining Qubits:  Difference from classical bits (0 or 1).Superposition: Qubits can be 0, 1, or a combination of both simultaneously.Entanglement:  Interconnected qubits influencing each other instantaneously.Different types of qubits (superconducting, trapped ions, photonic, etc.).Challenges in creating and maintaining stable qubits.</a:t>
+              <a:t>Qubits can represent 0, 1, or a combination of both simultaneously (superposition).Superposition allows quantum computers to explore multiple possibilities concurrently.Different physical systems can be used to represent qubits (e.g., trapped ions, superconducting circuits).Measurement collapses the superposition into a definite 0 or 1.Control and manipulation of qubits are crucial for quantum computation.Coherence time (how long a qubit maintains superposition) is a key challenge.</a:t>
             </a:r>
           </a:p>
         </p:txBody>
@@ -6041,7 +5915,7 @@
           <a:lstStyle/>
           <a:p>
             <a:r>
-              <a:t>Quantum Superposition and Entanglement</a:t>
+              <a:t>Quantum Entanglement and its Implications</a:t>
             </a:r>
           </a:p>
         </p:txBody>
@@ -6064,7 +5938,7 @@
           <a:p>
             <a:pPr/>
             <a:r>
-              <a:t>Detailed explanation of superposition and its implications.Illustrative examples of superposition in action.Explaining entanglement:  The Visual representations of superposition and entanglement.The role of these phenomena in quantum computation's power.</a:t>
+              <a:t>Entanglement links two or more qubits, regardless of distance.Measuring the state of one entangled qubit instantly reveals the state of the others.Entanglement enables powerful quantum algorithms and computations.Einstein called it Understanding and harnessing entanglement is vital for quantum technologies.Entanglement is a key resource for quantum communication and cryptography.</a:t>
             </a:r>
           </a:p>
         </p:txBody>
@@ -6103,7 +5977,7 @@
           <a:lstStyle/>
           <a:p>
             <a:r>
-              <a:t>Quantum Algorithms and Their Power</a:t>
+              <a:t>Quantum Algorithms and their Advantages</a:t>
             </a:r>
           </a:p>
         </p:txBody>
@@ -6126,7 +6000,7 @@
           <a:p>
             <a:pPr/>
             <a:r>
-              <a:t>Introduction to Shor's Algorithm (factoring large numbers).Introduction to Grover's Algorithm (database searching).Comparison of quantum algorithm performance with classical algorithms.Exploring other significant quantum algorithms.The potential for discovering new, powerful quantum algorithms.</a:t>
+              <a:t>Shor's algorithm: efficiently factors large numbers (cryptography implications).Grover's algorithm: speeds up database searches quadratically.Quantum algorithms offer exponential speedups over classical algorithms for specific problems.Development of new quantum algorithms is an active area of research.Quantum machine learning algorithms are emerging.Quantum simulation promises breakthroughs in materials science and drug discovery.</a:t>
             </a:r>
           </a:p>
         </p:txBody>
@@ -6165,7 +6039,7 @@
           <a:lstStyle/>
           <a:p>
             <a:r>
-              <a:t>Quantum Computing Applications</a:t>
+              <a:t>Current Applications and Future Potential</a:t>
             </a:r>
           </a:p>
         </p:txBody>
@@ -6188,7 +6062,7 @@
           <a:p>
             <a:pPr/>
             <a:r>
-              <a:t>Drug discovery and materials science: Simulating molecular interactions.Financial modeling:  Optimizing portfolios and risk management.Cryptography: Breaking current encryption standards and developing new ones.Artificial intelligence:  Accelerating machine learning algorithms.Optimization problems: Solving complex logistical and engineering challenges.</a:t>
+              <a:t>Drug discovery and materials science: simulating molecular interactions.Financial modeling: optimizing portfolios and risk management.Cryptography: developing quantum-resistant encryption methods.Optimization problems: solving complex logistics and scheduling tasks.Artificial intelligence: enhancing machine learning algorithms.Quantum sensing and metrology: improving precision measurements.</a:t>
             </a:r>
           </a:p>
         </p:txBody>
@@ -6227,7 +6101,7 @@
           <a:lstStyle/>
           <a:p>
             <a:r>
-              <a:t>Current Challenges and Limitations</a:t>
+              <a:t>Challenges and Limitations of Quantum Computing</a:t>
             </a:r>
           </a:p>
         </p:txBody>
@@ -6250,7 +6124,7 @@
           <a:p>
             <a:pPr/>
             <a:r>
-              <a:t>Qubit coherence and decoherence: Maintaining stability.Scalability issues: Building larger and more powerful quantum computers.Error correction:  Addressing errors inherent in quantum computations.High development and maintenance costs.The need for specialized infrastructure and expertise.</a:t>
+              <a:t>Building and maintaining stable qubits is technologically challenging.Error correction is crucial due to qubit decoherence.Quantum computers are currently expensive and require specialized environments.Scaling up the number of qubits while maintaining coherence is a major hurdle.Developing quantum algorithms requires specialized expertise.Limited availability and accessibility of quantum computing resources.</a:t>
             </a:r>
           </a:p>
         </p:txBody>

</xml_diff>